<commit_message>
Mets à jour pendulum sketch
</commit_message>
<xml_diff>
--- a/img/pendulum_sketch.pptx
+++ b/img/pendulum_sketch.pptx
@@ -3522,7 +3522,7 @@
               <a:t>m</a:t>
             </a:r>
             <a:r>
-              <a:rPr lang="en-US" b="1" i="1" dirty="0" smtClean="0">
+              <a:rPr lang="en-US" b="1" dirty="0" smtClean="0">
                 <a:solidFill>
                   <a:srgbClr val="FF0000"/>
                 </a:solidFill>
@@ -3531,7 +3531,7 @@
               </a:rPr>
               <a:t>g</a:t>
             </a:r>
-            <a:endParaRPr lang="fr-FR" b="1" i="1" dirty="0">
+            <a:endParaRPr lang="fr-FR" b="1" dirty="0">
               <a:solidFill>
                 <a:srgbClr val="FF0000"/>
               </a:solidFill>
@@ -3873,7 +3873,7 @@
         </p:nvSpPr>
         <p:spPr>
           <a:xfrm>
-            <a:off x="4315356" y="4139704"/>
+            <a:off x="4306563" y="4119187"/>
             <a:ext cx="1143008" cy="369332"/>
           </a:xfrm>
           <a:prstGeom prst="rect">
@@ -3986,7 +3986,7 @@
         </p:nvSpPr>
         <p:spPr>
           <a:xfrm>
-            <a:off x="2185236" y="3000372"/>
+            <a:off x="2164719" y="3000372"/>
             <a:ext cx="1143008" cy="369332"/>
           </a:xfrm>
           <a:prstGeom prst="rect">

</xml_diff>

<commit_message>
Ajoute explications projet pendule pas à pas
</commit_message>
<xml_diff>
--- a/img/pendulum_sketch.pptx
+++ b/img/pendulum_sketch.pptx
@@ -289,7 +289,7 @@
             <a:fld id="{89698DC9-2BF5-4A92-B821-61A5A6C56B51}" type="datetimeFigureOut">
               <a:rPr lang="fr-FR" smtClean="0"/>
               <a:pPr/>
-              <a:t>03/03/2019</a:t>
+              <a:t>24/03/2019</a:t>
             </a:fld>
             <a:endParaRPr lang="fr-FR"/>
           </a:p>
@@ -456,7 +456,7 @@
             <a:fld id="{89698DC9-2BF5-4A92-B821-61A5A6C56B51}" type="datetimeFigureOut">
               <a:rPr lang="fr-FR" smtClean="0"/>
               <a:pPr/>
-              <a:t>03/03/2019</a:t>
+              <a:t>24/03/2019</a:t>
             </a:fld>
             <a:endParaRPr lang="fr-FR"/>
           </a:p>
@@ -633,7 +633,7 @@
             <a:fld id="{89698DC9-2BF5-4A92-B821-61A5A6C56B51}" type="datetimeFigureOut">
               <a:rPr lang="fr-FR" smtClean="0"/>
               <a:pPr/>
-              <a:t>03/03/2019</a:t>
+              <a:t>24/03/2019</a:t>
             </a:fld>
             <a:endParaRPr lang="fr-FR"/>
           </a:p>
@@ -800,7 +800,7 @@
             <a:fld id="{89698DC9-2BF5-4A92-B821-61A5A6C56B51}" type="datetimeFigureOut">
               <a:rPr lang="fr-FR" smtClean="0"/>
               <a:pPr/>
-              <a:t>03/03/2019</a:t>
+              <a:t>24/03/2019</a:t>
             </a:fld>
             <a:endParaRPr lang="fr-FR"/>
           </a:p>
@@ -1043,7 +1043,7 @@
             <a:fld id="{89698DC9-2BF5-4A92-B821-61A5A6C56B51}" type="datetimeFigureOut">
               <a:rPr lang="fr-FR" smtClean="0"/>
               <a:pPr/>
-              <a:t>03/03/2019</a:t>
+              <a:t>24/03/2019</a:t>
             </a:fld>
             <a:endParaRPr lang="fr-FR"/>
           </a:p>
@@ -1328,7 +1328,7 @@
             <a:fld id="{89698DC9-2BF5-4A92-B821-61A5A6C56B51}" type="datetimeFigureOut">
               <a:rPr lang="fr-FR" smtClean="0"/>
               <a:pPr/>
-              <a:t>03/03/2019</a:t>
+              <a:t>24/03/2019</a:t>
             </a:fld>
             <a:endParaRPr lang="fr-FR"/>
           </a:p>
@@ -1747,7 +1747,7 @@
             <a:fld id="{89698DC9-2BF5-4A92-B821-61A5A6C56B51}" type="datetimeFigureOut">
               <a:rPr lang="fr-FR" smtClean="0"/>
               <a:pPr/>
-              <a:t>03/03/2019</a:t>
+              <a:t>24/03/2019</a:t>
             </a:fld>
             <a:endParaRPr lang="fr-FR"/>
           </a:p>
@@ -1862,7 +1862,7 @@
             <a:fld id="{89698DC9-2BF5-4A92-B821-61A5A6C56B51}" type="datetimeFigureOut">
               <a:rPr lang="fr-FR" smtClean="0"/>
               <a:pPr/>
-              <a:t>03/03/2019</a:t>
+              <a:t>24/03/2019</a:t>
             </a:fld>
             <a:endParaRPr lang="fr-FR"/>
           </a:p>
@@ -1954,7 +1954,7 @@
             <a:fld id="{89698DC9-2BF5-4A92-B821-61A5A6C56B51}" type="datetimeFigureOut">
               <a:rPr lang="fr-FR" smtClean="0"/>
               <a:pPr/>
-              <a:t>03/03/2019</a:t>
+              <a:t>24/03/2019</a:t>
             </a:fld>
             <a:endParaRPr lang="fr-FR"/>
           </a:p>
@@ -2228,7 +2228,7 @@
             <a:fld id="{89698DC9-2BF5-4A92-B821-61A5A6C56B51}" type="datetimeFigureOut">
               <a:rPr lang="fr-FR" smtClean="0"/>
               <a:pPr/>
-              <a:t>03/03/2019</a:t>
+              <a:t>24/03/2019</a:t>
             </a:fld>
             <a:endParaRPr lang="fr-FR"/>
           </a:p>
@@ -2478,7 +2478,7 @@
             <a:fld id="{89698DC9-2BF5-4A92-B821-61A5A6C56B51}" type="datetimeFigureOut">
               <a:rPr lang="fr-FR" smtClean="0"/>
               <a:pPr/>
-              <a:t>03/03/2019</a:t>
+              <a:t>24/03/2019</a:t>
             </a:fld>
             <a:endParaRPr lang="fr-FR"/>
           </a:p>
@@ -2688,7 +2688,7 @@
             <a:fld id="{89698DC9-2BF5-4A92-B821-61A5A6C56B51}" type="datetimeFigureOut">
               <a:rPr lang="fr-FR" smtClean="0"/>
               <a:pPr/>
-              <a:t>03/03/2019</a:t>
+              <a:t>24/03/2019</a:t>
             </a:fld>
             <a:endParaRPr lang="fr-FR"/>
           </a:p>
@@ -3177,111 +3177,21 @@
           </a:fontRef>
         </p:style>
       </p:cxnSp>
-      <p:sp>
-        <p:nvSpPr>
-          <p:cNvPr id="16" name="Arc 15"/>
-          <p:cNvSpPr/>
-          <p:nvPr/>
-        </p:nvSpPr>
-        <p:spPr>
-          <a:xfrm rot="6945861">
-            <a:off x="4119476" y="2704550"/>
-            <a:ext cx="457739" cy="657692"/>
-          </a:xfrm>
-          <a:prstGeom prst="arc">
-            <a:avLst>
-              <a:gd name="adj1" fmla="val 16200000"/>
-              <a:gd name="adj2" fmla="val 21193939"/>
-            </a:avLst>
-          </a:prstGeom>
-          <a:ln w="25400">
-            <a:solidFill>
-              <a:srgbClr val="00B050"/>
-            </a:solidFill>
-          </a:ln>
-        </p:spPr>
-        <p:style>
-          <a:lnRef idx="1">
-            <a:schemeClr val="accent1"/>
-          </a:lnRef>
-          <a:fillRef idx="0">
-            <a:schemeClr val="accent1"/>
-          </a:fillRef>
-          <a:effectRef idx="0">
-            <a:schemeClr val="accent1"/>
-          </a:effectRef>
-          <a:fontRef idx="minor">
-            <a:schemeClr val="tx1"/>
-          </a:fontRef>
-        </p:style>
-        <p:txBody>
-          <a:bodyPr rtlCol="0" anchor="ctr"/>
-          <a:lstStyle/>
-          <a:p>
-            <a:pPr algn="ctr"/>
-            <a:endParaRPr lang="fr-FR" dirty="0">
-              <a:solidFill>
-                <a:srgbClr val="00B050"/>
-              </a:solidFill>
-            </a:endParaRPr>
-          </a:p>
-        </p:txBody>
-      </p:sp>
-      <p:sp>
-        <p:nvSpPr>
-          <p:cNvPr id="17" name="ZoneTexte 16"/>
-          <p:cNvSpPr txBox="1"/>
-          <p:nvPr/>
-        </p:nvSpPr>
-        <p:spPr>
-          <a:xfrm>
-            <a:off x="4311123" y="3201464"/>
-            <a:ext cx="357190" cy="369332"/>
-          </a:xfrm>
-          <a:prstGeom prst="rect">
-            <a:avLst/>
-          </a:prstGeom>
-          <a:noFill/>
-        </p:spPr>
-        <p:txBody>
-          <a:bodyPr wrap="square" rtlCol="0">
-            <a:spAutoFit/>
-          </a:bodyPr>
-          <a:lstStyle/>
-          <a:p>
-            <a:r>
-              <a:rPr lang="en-US" i="1" dirty="0" smtClean="0">
-                <a:solidFill>
-                  <a:srgbClr val="00B050"/>
-                </a:solidFill>
-                <a:latin typeface="Symbol" pitchFamily="18" charset="2"/>
-              </a:rPr>
-              <a:t>q</a:t>
-            </a:r>
-            <a:endParaRPr lang="fr-FR" i="1" dirty="0">
-              <a:solidFill>
-                <a:srgbClr val="00B050"/>
-              </a:solidFill>
-              <a:latin typeface="Symbol" pitchFamily="18" charset="2"/>
-            </a:endParaRPr>
-          </a:p>
-        </p:txBody>
-      </p:sp>
       <p:cxnSp>
         <p:nvCxnSpPr>
-          <p:cNvPr id="22" name="Connecteur droit 21"/>
+          <p:cNvPr id="30" name="Connecteur droit 29"/>
           <p:cNvCxnSpPr/>
           <p:nvPr/>
         </p:nvCxnSpPr>
         <p:spPr>
-          <a:xfrm>
-            <a:off x="3643306" y="2642653"/>
-            <a:ext cx="1214446" cy="0"/>
+          <a:xfrm rot="16200000" flipH="1">
+            <a:off x="4809547" y="4771456"/>
+            <a:ext cx="1172536" cy="0"/>
           </a:xfrm>
           <a:prstGeom prst="line">
             <a:avLst/>
           </a:prstGeom>
-          <a:ln>
+          <a:ln w="38100">
             <a:solidFill>
               <a:schemeClr val="tx1"/>
             </a:solidFill>
@@ -3305,244 +3215,6 @@
       </p:cxnSp>
       <p:cxnSp>
         <p:nvCxnSpPr>
-          <p:cNvPr id="23" name="Connecteur droit 22"/>
-          <p:cNvCxnSpPr/>
-          <p:nvPr/>
-        </p:nvCxnSpPr>
-        <p:spPr>
-          <a:xfrm rot="5400000" flipH="1" flipV="1">
-            <a:off x="3790725" y="2590147"/>
-            <a:ext cx="928694" cy="0"/>
-          </a:xfrm>
-          <a:prstGeom prst="line">
-            <a:avLst/>
-          </a:prstGeom>
-          <a:ln>
-            <a:solidFill>
-              <a:schemeClr val="tx1"/>
-            </a:solidFill>
-            <a:tailEnd type="triangle"/>
-          </a:ln>
-        </p:spPr>
-        <p:style>
-          <a:lnRef idx="1">
-            <a:schemeClr val="accent1"/>
-          </a:lnRef>
-          <a:fillRef idx="0">
-            <a:schemeClr val="accent1"/>
-          </a:fillRef>
-          <a:effectRef idx="0">
-            <a:schemeClr val="accent1"/>
-          </a:effectRef>
-          <a:fontRef idx="minor">
-            <a:schemeClr val="tx1"/>
-          </a:fontRef>
-        </p:style>
-      </p:cxnSp>
-      <p:sp>
-        <p:nvSpPr>
-          <p:cNvPr id="27" name="ZoneTexte 26"/>
-          <p:cNvSpPr txBox="1"/>
-          <p:nvPr/>
-        </p:nvSpPr>
-        <p:spPr>
-          <a:xfrm>
-            <a:off x="4786314" y="2533644"/>
-            <a:ext cx="428628" cy="369332"/>
-          </a:xfrm>
-          <a:prstGeom prst="rect">
-            <a:avLst/>
-          </a:prstGeom>
-          <a:noFill/>
-        </p:spPr>
-        <p:txBody>
-          <a:bodyPr wrap="square" rtlCol="0">
-            <a:spAutoFit/>
-          </a:bodyPr>
-          <a:lstStyle/>
-          <a:p>
-            <a:r>
-              <a:rPr lang="en-US" i="1" dirty="0" smtClean="0">
-                <a:latin typeface="Times New Roman" pitchFamily="18" charset="0"/>
-                <a:cs typeface="Times New Roman" pitchFamily="18" charset="0"/>
-              </a:rPr>
-              <a:t>x</a:t>
-            </a:r>
-            <a:endParaRPr lang="fr-FR" i="1" dirty="0">
-              <a:latin typeface="Times New Roman" pitchFamily="18" charset="0"/>
-              <a:cs typeface="Times New Roman" pitchFamily="18" charset="0"/>
-            </a:endParaRPr>
-          </a:p>
-        </p:txBody>
-      </p:sp>
-      <p:sp>
-        <p:nvSpPr>
-          <p:cNvPr id="28" name="ZoneTexte 27"/>
-          <p:cNvSpPr txBox="1"/>
-          <p:nvPr/>
-        </p:nvSpPr>
-        <p:spPr>
-          <a:xfrm>
-            <a:off x="4286248" y="1962140"/>
-            <a:ext cx="428628" cy="369332"/>
-          </a:xfrm>
-          <a:prstGeom prst="rect">
-            <a:avLst/>
-          </a:prstGeom>
-          <a:noFill/>
-        </p:spPr>
-        <p:txBody>
-          <a:bodyPr wrap="square" rtlCol="0">
-            <a:spAutoFit/>
-          </a:bodyPr>
-          <a:lstStyle/>
-          <a:p>
-            <a:r>
-              <a:rPr lang="en-US" i="1" dirty="0" smtClean="0">
-                <a:latin typeface="Times New Roman" pitchFamily="18" charset="0"/>
-                <a:cs typeface="Times New Roman" pitchFamily="18" charset="0"/>
-              </a:rPr>
-              <a:t>y</a:t>
-            </a:r>
-            <a:endParaRPr lang="fr-FR" i="1" dirty="0">
-              <a:latin typeface="Times New Roman" pitchFamily="18" charset="0"/>
-              <a:cs typeface="Times New Roman" pitchFamily="18" charset="0"/>
-            </a:endParaRPr>
-          </a:p>
-        </p:txBody>
-      </p:sp>
-      <p:sp>
-        <p:nvSpPr>
-          <p:cNvPr id="29" name="ZoneTexte 28"/>
-          <p:cNvSpPr txBox="1"/>
-          <p:nvPr/>
-        </p:nvSpPr>
-        <p:spPr>
-          <a:xfrm>
-            <a:off x="4752450" y="3097765"/>
-            <a:ext cx="428628" cy="369332"/>
-          </a:xfrm>
-          <a:prstGeom prst="rect">
-            <a:avLst/>
-          </a:prstGeom>
-          <a:noFill/>
-        </p:spPr>
-        <p:txBody>
-          <a:bodyPr wrap="square" rtlCol="0">
-            <a:spAutoFit/>
-          </a:bodyPr>
-          <a:lstStyle/>
-          <a:p>
-            <a:r>
-              <a:rPr lang="en-US" i="1" dirty="0" smtClean="0">
-                <a:solidFill>
-                  <a:srgbClr val="C00000"/>
-                </a:solidFill>
-                <a:latin typeface="Times New Roman" pitchFamily="18" charset="0"/>
-                <a:cs typeface="Times New Roman" pitchFamily="18" charset="0"/>
-              </a:rPr>
-              <a:t>L</a:t>
-            </a:r>
-            <a:endParaRPr lang="fr-FR" i="1" dirty="0">
-              <a:solidFill>
-                <a:srgbClr val="C00000"/>
-              </a:solidFill>
-              <a:latin typeface="Times New Roman" pitchFamily="18" charset="0"/>
-              <a:cs typeface="Times New Roman" pitchFamily="18" charset="0"/>
-            </a:endParaRPr>
-          </a:p>
-        </p:txBody>
-      </p:sp>
-      <p:cxnSp>
-        <p:nvCxnSpPr>
-          <p:cNvPr id="30" name="Connecteur droit 29"/>
-          <p:cNvCxnSpPr/>
-          <p:nvPr/>
-        </p:nvCxnSpPr>
-        <p:spPr>
-          <a:xfrm rot="16200000" flipH="1">
-            <a:off x="4809547" y="4771456"/>
-            <a:ext cx="1172536" cy="0"/>
-          </a:xfrm>
-          <a:prstGeom prst="line">
-            <a:avLst/>
-          </a:prstGeom>
-          <a:ln w="38100">
-            <a:solidFill>
-              <a:srgbClr val="FF0000"/>
-            </a:solidFill>
-            <a:tailEnd type="triangle"/>
-          </a:ln>
-        </p:spPr>
-        <p:style>
-          <a:lnRef idx="1">
-            <a:schemeClr val="accent1"/>
-          </a:lnRef>
-          <a:fillRef idx="0">
-            <a:schemeClr val="accent1"/>
-          </a:fillRef>
-          <a:effectRef idx="0">
-            <a:schemeClr val="accent1"/>
-          </a:effectRef>
-          <a:fontRef idx="minor">
-            <a:schemeClr val="tx1"/>
-          </a:fontRef>
-        </p:style>
-      </p:cxnSp>
-      <p:sp>
-        <p:nvSpPr>
-          <p:cNvPr id="33" name="ZoneTexte 32"/>
-          <p:cNvSpPr txBox="1"/>
-          <p:nvPr/>
-        </p:nvSpPr>
-        <p:spPr>
-          <a:xfrm>
-            <a:off x="5000628" y="4559866"/>
-            <a:ext cx="571504" cy="369332"/>
-          </a:xfrm>
-          <a:prstGeom prst="rect">
-            <a:avLst/>
-          </a:prstGeom>
-          <a:noFill/>
-        </p:spPr>
-        <p:txBody>
-          <a:bodyPr wrap="square" rtlCol="0">
-            <a:spAutoFit/>
-          </a:bodyPr>
-          <a:lstStyle/>
-          <a:p>
-            <a:r>
-              <a:rPr lang="en-US" i="1" dirty="0" smtClean="0">
-                <a:solidFill>
-                  <a:srgbClr val="FF0000"/>
-                </a:solidFill>
-                <a:latin typeface="Times New Roman" pitchFamily="18" charset="0"/>
-                <a:cs typeface="Times New Roman" pitchFamily="18" charset="0"/>
-              </a:rPr>
-              <a:t>m</a:t>
-            </a:r>
-            <a:r>
-              <a:rPr lang="en-US" b="1" dirty="0" smtClean="0">
-                <a:solidFill>
-                  <a:srgbClr val="FF0000"/>
-                </a:solidFill>
-                <a:latin typeface="Times New Roman" pitchFamily="18" charset="0"/>
-                <a:cs typeface="Times New Roman" pitchFamily="18" charset="0"/>
-              </a:rPr>
-              <a:t>g</a:t>
-            </a:r>
-            <a:endParaRPr lang="fr-FR" b="1" dirty="0">
-              <a:solidFill>
-                <a:srgbClr val="FF0000"/>
-              </a:solidFill>
-              <a:latin typeface="Times New Roman" pitchFamily="18" charset="0"/>
-              <a:cs typeface="Times New Roman" pitchFamily="18" charset="0"/>
-            </a:endParaRPr>
-          </a:p>
-        </p:txBody>
-      </p:sp>
-      <p:cxnSp>
-        <p:nvCxnSpPr>
           <p:cNvPr id="6" name="Connecteur droit 5"/>
           <p:cNvCxnSpPr/>
           <p:nvPr/>
@@ -3557,7 +3229,9 @@
           </a:prstGeom>
           <a:ln w="25400">
             <a:solidFill>
-              <a:srgbClr val="C00000"/>
+              <a:schemeClr val="bg1">
+                <a:lumMod val="65000"/>
+              </a:schemeClr>
             </a:solidFill>
           </a:ln>
         </p:spPr>
@@ -3659,385 +3333,6 @@
           </a:p>
         </p:txBody>
       </p:sp>
-      <p:cxnSp>
-        <p:nvCxnSpPr>
-          <p:cNvPr id="37" name="Connecteur droit 36"/>
-          <p:cNvCxnSpPr/>
-          <p:nvPr/>
-        </p:nvCxnSpPr>
-        <p:spPr>
-          <a:xfrm rot="16200000" flipH="1">
-            <a:off x="5288616" y="4288492"/>
-            <a:ext cx="748244" cy="533168"/>
-          </a:xfrm>
-          <a:prstGeom prst="line">
-            <a:avLst/>
-          </a:prstGeom>
-          <a:ln w="19050">
-            <a:solidFill>
-              <a:srgbClr val="7030A0"/>
-            </a:solidFill>
-          </a:ln>
-        </p:spPr>
-        <p:style>
-          <a:lnRef idx="1">
-            <a:schemeClr val="accent1"/>
-          </a:lnRef>
-          <a:fillRef idx="0">
-            <a:schemeClr val="accent1"/>
-          </a:fillRef>
-          <a:effectRef idx="0">
-            <a:schemeClr val="accent1"/>
-          </a:effectRef>
-          <a:fontRef idx="minor">
-            <a:schemeClr val="tx1"/>
-          </a:fontRef>
-        </p:style>
-      </p:cxnSp>
-      <p:cxnSp>
-        <p:nvCxnSpPr>
-          <p:cNvPr id="39" name="Connecteur droit 38"/>
-          <p:cNvCxnSpPr/>
-          <p:nvPr/>
-        </p:nvCxnSpPr>
-        <p:spPr>
-          <a:xfrm rot="10800000" flipV="1">
-            <a:off x="4857752" y="4181476"/>
-            <a:ext cx="533930" cy="390531"/>
-          </a:xfrm>
-          <a:prstGeom prst="line">
-            <a:avLst/>
-          </a:prstGeom>
-          <a:ln w="19050">
-            <a:solidFill>
-              <a:schemeClr val="accent6">
-                <a:lumMod val="75000"/>
-              </a:schemeClr>
-            </a:solidFill>
-          </a:ln>
-        </p:spPr>
-        <p:style>
-          <a:lnRef idx="1">
-            <a:schemeClr val="accent1"/>
-          </a:lnRef>
-          <a:fillRef idx="0">
-            <a:schemeClr val="accent1"/>
-          </a:fillRef>
-          <a:effectRef idx="0">
-            <a:schemeClr val="accent1"/>
-          </a:effectRef>
-          <a:fontRef idx="minor">
-            <a:schemeClr val="tx1"/>
-          </a:fontRef>
-        </p:style>
-      </p:cxnSp>
-      <p:cxnSp>
-        <p:nvCxnSpPr>
-          <p:cNvPr id="44" name="Connecteur droit 43"/>
-          <p:cNvCxnSpPr/>
-          <p:nvPr/>
-        </p:nvCxnSpPr>
-        <p:spPr>
-          <a:xfrm rot="16200000" flipH="1">
-            <a:off x="4731123" y="4698637"/>
-            <a:ext cx="790434" cy="537176"/>
-          </a:xfrm>
-          <a:prstGeom prst="line">
-            <a:avLst/>
-          </a:prstGeom>
-          <a:ln>
-            <a:solidFill>
-              <a:srgbClr val="7030A0"/>
-            </a:solidFill>
-            <a:prstDash val="dash"/>
-          </a:ln>
-        </p:spPr>
-        <p:style>
-          <a:lnRef idx="1">
-            <a:schemeClr val="accent1"/>
-          </a:lnRef>
-          <a:fillRef idx="0">
-            <a:schemeClr val="accent1"/>
-          </a:fillRef>
-          <a:effectRef idx="0">
-            <a:schemeClr val="accent1"/>
-          </a:effectRef>
-          <a:fontRef idx="minor">
-            <a:schemeClr val="tx1"/>
-          </a:fontRef>
-        </p:style>
-      </p:cxnSp>
-      <p:cxnSp>
-        <p:nvCxnSpPr>
-          <p:cNvPr id="47" name="Connecteur droit 46"/>
-          <p:cNvCxnSpPr/>
-          <p:nvPr/>
-        </p:nvCxnSpPr>
-        <p:spPr>
-          <a:xfrm rot="10800000" flipV="1">
-            <a:off x="5403858" y="4946130"/>
-            <a:ext cx="533930" cy="390531"/>
-          </a:xfrm>
-          <a:prstGeom prst="line">
-            <a:avLst/>
-          </a:prstGeom>
-          <a:ln>
-            <a:solidFill>
-              <a:schemeClr val="accent6"/>
-            </a:solidFill>
-            <a:prstDash val="dash"/>
-          </a:ln>
-        </p:spPr>
-        <p:style>
-          <a:lnRef idx="1">
-            <a:schemeClr val="accent1"/>
-          </a:lnRef>
-          <a:fillRef idx="0">
-            <a:schemeClr val="accent1"/>
-          </a:fillRef>
-          <a:effectRef idx="0">
-            <a:schemeClr val="accent1"/>
-          </a:effectRef>
-          <a:fontRef idx="minor">
-            <a:schemeClr val="tx1"/>
-          </a:fontRef>
-        </p:style>
-      </p:cxnSp>
-      <p:sp>
-        <p:nvSpPr>
-          <p:cNvPr id="49" name="ZoneTexte 48"/>
-          <p:cNvSpPr txBox="1"/>
-          <p:nvPr/>
-        </p:nvSpPr>
-        <p:spPr>
-          <a:xfrm>
-            <a:off x="5693843" y="4400058"/>
-            <a:ext cx="1143008" cy="369332"/>
-          </a:xfrm>
-          <a:prstGeom prst="rect">
-            <a:avLst/>
-          </a:prstGeom>
-          <a:noFill/>
-        </p:spPr>
-        <p:txBody>
-          <a:bodyPr wrap="square" rtlCol="0">
-            <a:spAutoFit/>
-          </a:bodyPr>
-          <a:lstStyle/>
-          <a:p>
-            <a:r>
-              <a:rPr lang="en-US" i="1" dirty="0" err="1" smtClean="0">
-                <a:solidFill>
-                  <a:srgbClr val="7030A0"/>
-                </a:solidFill>
-                <a:latin typeface="Times New Roman" pitchFamily="18" charset="0"/>
-                <a:cs typeface="Times New Roman" pitchFamily="18" charset="0"/>
-              </a:rPr>
-              <a:t>mg</a:t>
-            </a:r>
-            <a:r>
-              <a:rPr lang="en-US" dirty="0" err="1" smtClean="0">
-                <a:solidFill>
-                  <a:srgbClr val="7030A0"/>
-                </a:solidFill>
-                <a:latin typeface="Times New Roman" pitchFamily="18" charset="0"/>
-                <a:cs typeface="Times New Roman" pitchFamily="18" charset="0"/>
-              </a:rPr>
-              <a:t>cos</a:t>
-            </a:r>
-            <a:r>
-              <a:rPr lang="en-US" i="1" dirty="0" err="1" smtClean="0">
-                <a:solidFill>
-                  <a:srgbClr val="7030A0"/>
-                </a:solidFill>
-                <a:latin typeface="Symbol" pitchFamily="18" charset="2"/>
-                <a:cs typeface="Times New Roman" pitchFamily="18" charset="0"/>
-              </a:rPr>
-              <a:t>q</a:t>
-            </a:r>
-            <a:endParaRPr lang="fr-FR" i="1" dirty="0">
-              <a:solidFill>
-                <a:srgbClr val="7030A0"/>
-              </a:solidFill>
-              <a:latin typeface="Times New Roman" pitchFamily="18" charset="0"/>
-              <a:cs typeface="Times New Roman" pitchFamily="18" charset="0"/>
-            </a:endParaRPr>
-          </a:p>
-        </p:txBody>
-      </p:sp>
-      <p:sp>
-        <p:nvSpPr>
-          <p:cNvPr id="50" name="ZoneTexte 49"/>
-          <p:cNvSpPr txBox="1"/>
-          <p:nvPr/>
-        </p:nvSpPr>
-        <p:spPr>
-          <a:xfrm>
-            <a:off x="4306563" y="4119187"/>
-            <a:ext cx="1143008" cy="369332"/>
-          </a:xfrm>
-          <a:prstGeom prst="rect">
-            <a:avLst/>
-          </a:prstGeom>
-          <a:noFill/>
-        </p:spPr>
-        <p:txBody>
-          <a:bodyPr wrap="square" rtlCol="0">
-            <a:spAutoFit/>
-          </a:bodyPr>
-          <a:lstStyle/>
-          <a:p>
-            <a:r>
-              <a:rPr lang="en-US" i="1" dirty="0" err="1" smtClean="0">
-                <a:solidFill>
-                  <a:schemeClr val="accent6"/>
-                </a:solidFill>
-                <a:latin typeface="Times New Roman" pitchFamily="18" charset="0"/>
-                <a:cs typeface="Times New Roman" pitchFamily="18" charset="0"/>
-              </a:rPr>
-              <a:t>mg</a:t>
-            </a:r>
-            <a:r>
-              <a:rPr lang="en-US" dirty="0" err="1" smtClean="0">
-                <a:solidFill>
-                  <a:schemeClr val="accent6"/>
-                </a:solidFill>
-                <a:latin typeface="Times New Roman" pitchFamily="18" charset="0"/>
-                <a:cs typeface="Times New Roman" pitchFamily="18" charset="0"/>
-              </a:rPr>
-              <a:t>sin</a:t>
-            </a:r>
-            <a:r>
-              <a:rPr lang="en-US" i="1" dirty="0" err="1" smtClean="0">
-                <a:solidFill>
-                  <a:schemeClr val="accent6"/>
-                </a:solidFill>
-                <a:latin typeface="Symbol" pitchFamily="18" charset="2"/>
-                <a:cs typeface="Times New Roman" pitchFamily="18" charset="0"/>
-              </a:rPr>
-              <a:t>q</a:t>
-            </a:r>
-            <a:endParaRPr lang="fr-FR" i="1" dirty="0">
-              <a:solidFill>
-                <a:schemeClr val="accent6"/>
-              </a:solidFill>
-              <a:latin typeface="Times New Roman" pitchFamily="18" charset="0"/>
-              <a:cs typeface="Times New Roman" pitchFamily="18" charset="0"/>
-            </a:endParaRPr>
-          </a:p>
-        </p:txBody>
-      </p:sp>
-      <p:sp>
-        <p:nvSpPr>
-          <p:cNvPr id="31" name="ZoneTexte 30"/>
-          <p:cNvSpPr txBox="1"/>
-          <p:nvPr/>
-        </p:nvSpPr>
-        <p:spPr>
-          <a:xfrm>
-            <a:off x="3720606" y="4988494"/>
-            <a:ext cx="1071570" cy="369332"/>
-          </a:xfrm>
-          <a:prstGeom prst="rect">
-            <a:avLst/>
-          </a:prstGeom>
-          <a:noFill/>
-        </p:spPr>
-        <p:txBody>
-          <a:bodyPr wrap="square" rtlCol="0">
-            <a:spAutoFit/>
-          </a:bodyPr>
-          <a:lstStyle/>
-          <a:p>
-            <a:pPr algn="ctr"/>
-            <a:r>
-              <a:rPr lang="en-US" i="1" dirty="0" smtClean="0">
-                <a:solidFill>
-                  <a:srgbClr val="00B050"/>
-                </a:solidFill>
-                <a:latin typeface="Symbol" pitchFamily="18" charset="2"/>
-              </a:rPr>
-              <a:t>q </a:t>
-            </a:r>
-            <a:r>
-              <a:rPr lang="en-US" dirty="0" smtClean="0">
-                <a:solidFill>
-                  <a:srgbClr val="00B050"/>
-                </a:solidFill>
-                <a:latin typeface="Times New Roman" pitchFamily="18" charset="0"/>
-                <a:cs typeface="Times New Roman" pitchFamily="18" charset="0"/>
-              </a:rPr>
-              <a:t>=</a:t>
-            </a:r>
-            <a:r>
-              <a:rPr lang="en-US" dirty="0" smtClean="0">
-                <a:solidFill>
-                  <a:srgbClr val="00B050"/>
-                </a:solidFill>
-                <a:latin typeface="Times New Roman" pitchFamily="18" charset="0"/>
-                <a:cs typeface="Times New Roman" pitchFamily="18" charset="0"/>
-              </a:rPr>
-              <a:t>0 </a:t>
-            </a:r>
-            <a:r>
-              <a:rPr lang="en-US" dirty="0" err="1" smtClean="0">
-                <a:solidFill>
-                  <a:srgbClr val="00B050"/>
-                </a:solidFill>
-                <a:latin typeface="Times New Roman" pitchFamily="18" charset="0"/>
-                <a:cs typeface="Times New Roman" pitchFamily="18" charset="0"/>
-              </a:rPr>
-              <a:t>rad</a:t>
-            </a:r>
-            <a:endParaRPr lang="fr-FR" dirty="0">
-              <a:solidFill>
-                <a:srgbClr val="00B050"/>
-              </a:solidFill>
-              <a:latin typeface="Times New Roman" pitchFamily="18" charset="0"/>
-              <a:cs typeface="Times New Roman" pitchFamily="18" charset="0"/>
-            </a:endParaRPr>
-          </a:p>
-        </p:txBody>
-      </p:sp>
-      <p:cxnSp>
-        <p:nvCxnSpPr>
-          <p:cNvPr id="34" name="Connecteur droit avec flèche 33"/>
-          <p:cNvCxnSpPr>
-            <a:stCxn id="31" idx="0"/>
-            <a:endCxn id="41" idx="4"/>
-          </p:cNvCxnSpPr>
-          <p:nvPr/>
-        </p:nvCxnSpPr>
-        <p:spPr>
-          <a:xfrm rot="16200000" flipV="1">
-            <a:off x="4040258" y="4772360"/>
-            <a:ext cx="431662" cy="605"/>
-          </a:xfrm>
-          <a:prstGeom prst="straightConnector1">
-            <a:avLst/>
-          </a:prstGeom>
-          <a:ln w="25400">
-            <a:solidFill>
-              <a:srgbClr val="00B050"/>
-            </a:solidFill>
-            <a:tailEnd type="triangle"/>
-          </a:ln>
-        </p:spPr>
-        <p:style>
-          <a:lnRef idx="1">
-            <a:schemeClr val="accent1"/>
-          </a:lnRef>
-          <a:fillRef idx="0">
-            <a:schemeClr val="accent1"/>
-          </a:fillRef>
-          <a:effectRef idx="0">
-            <a:schemeClr val="accent1"/>
-          </a:effectRef>
-          <a:fontRef idx="minor">
-            <a:schemeClr val="tx1"/>
-          </a:fontRef>
-        </p:style>
-      </p:cxnSp>
       <p:sp>
         <p:nvSpPr>
           <p:cNvPr id="32" name="ZoneTexte 31"/>
@@ -4189,252 +3484,82 @@
           </a:fontRef>
         </p:style>
       </p:cxnSp>
-      <p:sp>
-        <p:nvSpPr>
-          <p:cNvPr id="36" name="ZoneTexte 35"/>
-          <p:cNvSpPr txBox="1"/>
+      <p:graphicFrame>
+        <p:nvGraphicFramePr>
+          <p:cNvPr id="46" name="Objet 45"/>
+          <p:cNvGraphicFramePr>
+            <a:graphicFrameLocks noChangeAspect="1"/>
+          </p:cNvGraphicFramePr>
           <p:nvPr/>
-        </p:nvSpPr>
+        </p:nvGraphicFramePr>
+        <p:xfrm>
+          <a:off x="5072066" y="4643446"/>
+          <a:ext cx="295276" cy="393701"/>
+        </p:xfrm>
+        <a:graphic>
+          <a:graphicData uri="http://schemas.openxmlformats.org/presentationml/2006/ole">
+            <p:oleObj spid="_x0000_s1026" name="Équation" r:id="rId3" imgW="152280" imgH="203040" progId="Equation.3">
+              <p:embed/>
+            </p:oleObj>
+          </a:graphicData>
+        </a:graphic>
+      </p:graphicFrame>
+      <p:graphicFrame>
+        <p:nvGraphicFramePr>
+          <p:cNvPr id="1027" name="Object 3"/>
+          <p:cNvGraphicFramePr>
+            <a:graphicFrameLocks noChangeAspect="1"/>
+          </p:cNvGraphicFramePr>
+          <p:nvPr/>
+        </p:nvGraphicFramePr>
+        <p:xfrm>
+          <a:off x="4714876" y="3571876"/>
+          <a:ext cx="271463" cy="428628"/>
+        </p:xfrm>
+        <a:graphic>
+          <a:graphicData uri="http://schemas.openxmlformats.org/presentationml/2006/ole">
+            <p:oleObj spid="_x0000_s1027" name="Équation" r:id="rId4" imgW="139680" imgH="203040" progId="Equation.3">
+              <p:embed/>
+            </p:oleObj>
+          </a:graphicData>
+        </a:graphic>
+      </p:graphicFrame>
+      <p:cxnSp>
+        <p:nvCxnSpPr>
+          <p:cNvPr id="48" name="Connecteur droit 47"/>
+          <p:cNvCxnSpPr/>
+          <p:nvPr/>
+        </p:nvCxnSpPr>
         <p:spPr>
-          <a:xfrm>
-            <a:off x="6072198" y="2345288"/>
-            <a:ext cx="1214446" cy="369332"/>
+          <a:xfrm rot="16200000" flipV="1">
+            <a:off x="4679636" y="3464241"/>
+            <a:ext cx="822495" cy="609138"/>
           </a:xfrm>
-          <a:prstGeom prst="rect">
+          <a:prstGeom prst="line">
             <a:avLst/>
           </a:prstGeom>
-          <a:noFill/>
+          <a:ln w="38100">
+            <a:solidFill>
+              <a:schemeClr val="tx1"/>
+            </a:solidFill>
+            <a:tailEnd type="triangle"/>
+          </a:ln>
         </p:spPr>
-        <p:txBody>
-          <a:bodyPr wrap="square" rtlCol="0">
-            <a:spAutoFit/>
-          </a:bodyPr>
-          <a:lstStyle/>
-          <a:p>
-            <a:pPr algn="ctr"/>
-            <a:r>
-              <a:rPr lang="en-US" i="1" dirty="0" smtClean="0">
-                <a:solidFill>
-                  <a:srgbClr val="00B050"/>
-                </a:solidFill>
-                <a:latin typeface="Symbol" pitchFamily="18" charset="2"/>
-              </a:rPr>
-              <a:t>q </a:t>
-            </a:r>
-            <a:r>
-              <a:rPr lang="en-US" dirty="0" smtClean="0">
-                <a:solidFill>
-                  <a:srgbClr val="00B050"/>
-                </a:solidFill>
-                <a:latin typeface="Times New Roman" pitchFamily="18" charset="0"/>
-                <a:cs typeface="Times New Roman" pitchFamily="18" charset="0"/>
-              </a:rPr>
-              <a:t>=</a:t>
-            </a:r>
-            <a:r>
-              <a:rPr lang="en-US" dirty="0" smtClean="0">
-                <a:solidFill>
-                  <a:srgbClr val="00B050"/>
-                </a:solidFill>
-                <a:latin typeface="Symbol" pitchFamily="18" charset="2"/>
-                <a:cs typeface="Times New Roman" pitchFamily="18" charset="0"/>
-              </a:rPr>
-              <a:t>p/2</a:t>
-            </a:r>
-            <a:r>
-              <a:rPr lang="en-US" dirty="0" smtClean="0">
-                <a:solidFill>
-                  <a:srgbClr val="00B050"/>
-                </a:solidFill>
-                <a:latin typeface="Times New Roman" pitchFamily="18" charset="0"/>
-                <a:cs typeface="Times New Roman" pitchFamily="18" charset="0"/>
-              </a:rPr>
-              <a:t> </a:t>
-            </a:r>
-            <a:r>
-              <a:rPr lang="en-US" dirty="0" err="1" smtClean="0">
-                <a:solidFill>
-                  <a:srgbClr val="00B050"/>
-                </a:solidFill>
-                <a:latin typeface="Times New Roman" pitchFamily="18" charset="0"/>
-                <a:cs typeface="Times New Roman" pitchFamily="18" charset="0"/>
-              </a:rPr>
-              <a:t>rad</a:t>
-            </a:r>
-            <a:endParaRPr lang="fr-FR" dirty="0">
-              <a:solidFill>
-                <a:srgbClr val="00B050"/>
-              </a:solidFill>
-              <a:latin typeface="Times New Roman" pitchFamily="18" charset="0"/>
-              <a:cs typeface="Times New Roman" pitchFamily="18" charset="0"/>
-            </a:endParaRPr>
-          </a:p>
-        </p:txBody>
-      </p:sp>
-      <p:sp>
-        <p:nvSpPr>
-          <p:cNvPr id="42" name="ZoneTexte 41"/>
-          <p:cNvSpPr txBox="1"/>
-          <p:nvPr/>
-        </p:nvSpPr>
-        <p:spPr>
-          <a:xfrm>
-            <a:off x="1142976" y="2321164"/>
-            <a:ext cx="1285884" cy="369332"/>
-          </a:xfrm>
-          <a:prstGeom prst="rect">
-            <a:avLst/>
-          </a:prstGeom>
-          <a:noFill/>
-        </p:spPr>
-        <p:txBody>
-          <a:bodyPr wrap="square" rtlCol="0">
-            <a:spAutoFit/>
-          </a:bodyPr>
-          <a:lstStyle/>
-          <a:p>
-            <a:pPr algn="ctr"/>
-            <a:r>
-              <a:rPr lang="en-US" i="1" dirty="0" smtClean="0">
-                <a:solidFill>
-                  <a:srgbClr val="00B050"/>
-                </a:solidFill>
-                <a:latin typeface="Symbol" pitchFamily="18" charset="2"/>
-              </a:rPr>
-              <a:t>q </a:t>
-            </a:r>
-            <a:r>
-              <a:rPr lang="en-US" dirty="0" smtClean="0">
-                <a:solidFill>
-                  <a:srgbClr val="00B050"/>
-                </a:solidFill>
-                <a:latin typeface="Times New Roman" pitchFamily="18" charset="0"/>
-                <a:cs typeface="Times New Roman" pitchFamily="18" charset="0"/>
-              </a:rPr>
-              <a:t>=-</a:t>
-            </a:r>
-            <a:r>
-              <a:rPr lang="en-US" dirty="0" smtClean="0">
-                <a:solidFill>
-                  <a:srgbClr val="00B050"/>
-                </a:solidFill>
-                <a:latin typeface="Symbol" pitchFamily="18" charset="2"/>
-                <a:cs typeface="Times New Roman" pitchFamily="18" charset="0"/>
-              </a:rPr>
-              <a:t>p/2</a:t>
-            </a:r>
-            <a:r>
-              <a:rPr lang="en-US" dirty="0" smtClean="0">
-                <a:solidFill>
-                  <a:srgbClr val="00B050"/>
-                </a:solidFill>
-                <a:latin typeface="Times New Roman" pitchFamily="18" charset="0"/>
-                <a:cs typeface="Times New Roman" pitchFamily="18" charset="0"/>
-              </a:rPr>
-              <a:t> </a:t>
-            </a:r>
-            <a:r>
-              <a:rPr lang="en-US" dirty="0" err="1" smtClean="0">
-                <a:solidFill>
-                  <a:srgbClr val="00B050"/>
-                </a:solidFill>
-                <a:latin typeface="Times New Roman" pitchFamily="18" charset="0"/>
-                <a:cs typeface="Times New Roman" pitchFamily="18" charset="0"/>
-              </a:rPr>
-              <a:t>rad</a:t>
-            </a:r>
-            <a:endParaRPr lang="fr-FR" dirty="0">
-              <a:solidFill>
-                <a:srgbClr val="00B050"/>
-              </a:solidFill>
-              <a:latin typeface="Times New Roman" pitchFamily="18" charset="0"/>
-              <a:cs typeface="Times New Roman" pitchFamily="18" charset="0"/>
-            </a:endParaRPr>
-          </a:p>
-        </p:txBody>
-      </p:sp>
-      <p:sp>
-        <p:nvSpPr>
-          <p:cNvPr id="45" name="ZoneTexte 44"/>
-          <p:cNvSpPr txBox="1"/>
-          <p:nvPr/>
-        </p:nvSpPr>
-        <p:spPr>
-          <a:xfrm>
-            <a:off x="3531577" y="357166"/>
-            <a:ext cx="1214446" cy="369332"/>
-          </a:xfrm>
-          <a:prstGeom prst="rect">
-            <a:avLst/>
-          </a:prstGeom>
-          <a:noFill/>
-        </p:spPr>
-        <p:txBody>
-          <a:bodyPr wrap="square" rtlCol="0">
-            <a:spAutoFit/>
-          </a:bodyPr>
-          <a:lstStyle/>
-          <a:p>
-            <a:pPr algn="ctr"/>
-            <a:r>
-              <a:rPr lang="en-US" i="1" dirty="0" smtClean="0">
-                <a:solidFill>
-                  <a:srgbClr val="00B050"/>
-                </a:solidFill>
-                <a:latin typeface="Symbol" pitchFamily="18" charset="2"/>
-              </a:rPr>
-              <a:t>q </a:t>
-            </a:r>
-            <a:r>
-              <a:rPr lang="en-US" dirty="0" smtClean="0">
-                <a:solidFill>
-                  <a:srgbClr val="00B050"/>
-                </a:solidFill>
-                <a:latin typeface="Times New Roman" pitchFamily="18" charset="0"/>
-                <a:cs typeface="Times New Roman" pitchFamily="18" charset="0"/>
-              </a:rPr>
-              <a:t>=±</a:t>
-            </a:r>
-            <a:r>
-              <a:rPr lang="en-US" dirty="0" smtClean="0">
-                <a:solidFill>
-                  <a:srgbClr val="00B050"/>
-                </a:solidFill>
-                <a:latin typeface="Symbol" pitchFamily="18" charset="2"/>
-                <a:cs typeface="Times New Roman" pitchFamily="18" charset="0"/>
-              </a:rPr>
-              <a:t>p</a:t>
-            </a:r>
-            <a:r>
-              <a:rPr lang="en-US" dirty="0" smtClean="0">
-                <a:solidFill>
-                  <a:srgbClr val="00B050"/>
-                </a:solidFill>
-                <a:latin typeface="Times New Roman" pitchFamily="18" charset="0"/>
-                <a:cs typeface="Times New Roman" pitchFamily="18" charset="0"/>
-              </a:rPr>
-              <a:t> </a:t>
-            </a:r>
-            <a:r>
-              <a:rPr lang="en-US" dirty="0" err="1" smtClean="0">
-                <a:solidFill>
-                  <a:srgbClr val="00B050"/>
-                </a:solidFill>
-                <a:latin typeface="Times New Roman" pitchFamily="18" charset="0"/>
-                <a:cs typeface="Times New Roman" pitchFamily="18" charset="0"/>
-              </a:rPr>
-              <a:t>rad</a:t>
-            </a:r>
-            <a:endParaRPr lang="fr-FR" dirty="0">
-              <a:solidFill>
-                <a:srgbClr val="00B050"/>
-              </a:solidFill>
-              <a:latin typeface="Times New Roman" pitchFamily="18" charset="0"/>
-              <a:cs typeface="Times New Roman" pitchFamily="18" charset="0"/>
-            </a:endParaRPr>
-          </a:p>
-        </p:txBody>
-      </p:sp>
+        <p:style>
+          <a:lnRef idx="1">
+            <a:schemeClr val="accent1"/>
+          </a:lnRef>
+          <a:fillRef idx="0">
+            <a:schemeClr val="accent1"/>
+          </a:fillRef>
+          <a:effectRef idx="0">
+            <a:schemeClr val="accent1"/>
+          </a:effectRef>
+          <a:fontRef idx="minor">
+            <a:schemeClr val="tx1"/>
+          </a:fontRef>
+        </p:style>
+      </p:cxnSp>
     </p:spTree>
   </p:cSld>
   <p:clrMapOvr>

</xml_diff>

<commit_message>
Mets à jour image pendule
</commit_message>
<xml_diff>
--- a/img/pendulum_sketch.pptx
+++ b/img/pendulum_sketch.pptx
@@ -289,7 +289,7 @@
             <a:fld id="{89698DC9-2BF5-4A92-B821-61A5A6C56B51}" type="datetimeFigureOut">
               <a:rPr lang="fr-FR" smtClean="0"/>
               <a:pPr/>
-              <a:t>25/03/2019</a:t>
+              <a:t>27/08/2020</a:t>
             </a:fld>
             <a:endParaRPr lang="fr-FR"/>
           </a:p>
@@ -456,7 +456,7 @@
             <a:fld id="{89698DC9-2BF5-4A92-B821-61A5A6C56B51}" type="datetimeFigureOut">
               <a:rPr lang="fr-FR" smtClean="0"/>
               <a:pPr/>
-              <a:t>25/03/2019</a:t>
+              <a:t>27/08/2020</a:t>
             </a:fld>
             <a:endParaRPr lang="fr-FR"/>
           </a:p>
@@ -633,7 +633,7 @@
             <a:fld id="{89698DC9-2BF5-4A92-B821-61A5A6C56B51}" type="datetimeFigureOut">
               <a:rPr lang="fr-FR" smtClean="0"/>
               <a:pPr/>
-              <a:t>25/03/2019</a:t>
+              <a:t>27/08/2020</a:t>
             </a:fld>
             <a:endParaRPr lang="fr-FR"/>
           </a:p>
@@ -800,7 +800,7 @@
             <a:fld id="{89698DC9-2BF5-4A92-B821-61A5A6C56B51}" type="datetimeFigureOut">
               <a:rPr lang="fr-FR" smtClean="0"/>
               <a:pPr/>
-              <a:t>25/03/2019</a:t>
+              <a:t>27/08/2020</a:t>
             </a:fld>
             <a:endParaRPr lang="fr-FR"/>
           </a:p>
@@ -1043,7 +1043,7 @@
             <a:fld id="{89698DC9-2BF5-4A92-B821-61A5A6C56B51}" type="datetimeFigureOut">
               <a:rPr lang="fr-FR" smtClean="0"/>
               <a:pPr/>
-              <a:t>25/03/2019</a:t>
+              <a:t>27/08/2020</a:t>
             </a:fld>
             <a:endParaRPr lang="fr-FR"/>
           </a:p>
@@ -1328,7 +1328,7 @@
             <a:fld id="{89698DC9-2BF5-4A92-B821-61A5A6C56B51}" type="datetimeFigureOut">
               <a:rPr lang="fr-FR" smtClean="0"/>
               <a:pPr/>
-              <a:t>25/03/2019</a:t>
+              <a:t>27/08/2020</a:t>
             </a:fld>
             <a:endParaRPr lang="fr-FR"/>
           </a:p>
@@ -1747,7 +1747,7 @@
             <a:fld id="{89698DC9-2BF5-4A92-B821-61A5A6C56B51}" type="datetimeFigureOut">
               <a:rPr lang="fr-FR" smtClean="0"/>
               <a:pPr/>
-              <a:t>25/03/2019</a:t>
+              <a:t>27/08/2020</a:t>
             </a:fld>
             <a:endParaRPr lang="fr-FR"/>
           </a:p>
@@ -1862,7 +1862,7 @@
             <a:fld id="{89698DC9-2BF5-4A92-B821-61A5A6C56B51}" type="datetimeFigureOut">
               <a:rPr lang="fr-FR" smtClean="0"/>
               <a:pPr/>
-              <a:t>25/03/2019</a:t>
+              <a:t>27/08/2020</a:t>
             </a:fld>
             <a:endParaRPr lang="fr-FR"/>
           </a:p>
@@ -1954,7 +1954,7 @@
             <a:fld id="{89698DC9-2BF5-4A92-B821-61A5A6C56B51}" type="datetimeFigureOut">
               <a:rPr lang="fr-FR" smtClean="0"/>
               <a:pPr/>
-              <a:t>25/03/2019</a:t>
+              <a:t>27/08/2020</a:t>
             </a:fld>
             <a:endParaRPr lang="fr-FR"/>
           </a:p>
@@ -2228,7 +2228,7 @@
             <a:fld id="{89698DC9-2BF5-4A92-B821-61A5A6C56B51}" type="datetimeFigureOut">
               <a:rPr lang="fr-FR" smtClean="0"/>
               <a:pPr/>
-              <a:t>25/03/2019</a:t>
+              <a:t>27/08/2020</a:t>
             </a:fld>
             <a:endParaRPr lang="fr-FR"/>
           </a:p>
@@ -2478,7 +2478,7 @@
             <a:fld id="{89698DC9-2BF5-4A92-B821-61A5A6C56B51}" type="datetimeFigureOut">
               <a:rPr lang="fr-FR" smtClean="0"/>
               <a:pPr/>
-              <a:t>25/03/2019</a:t>
+              <a:t>27/08/2020</a:t>
             </a:fld>
             <a:endParaRPr lang="fr-FR"/>
           </a:p>
@@ -2688,7 +2688,7 @@
             <a:fld id="{89698DC9-2BF5-4A92-B821-61A5A6C56B51}" type="datetimeFigureOut">
               <a:rPr lang="fr-FR" smtClean="0"/>
               <a:pPr/>
-              <a:t>25/03/2019</a:t>
+              <a:t>27/08/2020</a:t>
             </a:fld>
             <a:endParaRPr lang="fr-FR"/>
           </a:p>
@@ -3142,14 +3142,12 @@
       <p:cxnSp>
         <p:nvCxnSpPr>
           <p:cNvPr id="15" name="Connecteur droit 14"/>
-          <p:cNvCxnSpPr>
-            <a:endCxn id="41" idx="4"/>
-          </p:cNvCxnSpPr>
+          <p:cNvCxnSpPr/>
           <p:nvPr/>
         </p:nvCxnSpPr>
         <p:spPr>
           <a:xfrm rot="16200000" flipH="1">
-            <a:off x="2155309" y="2456355"/>
+            <a:off x="2155309" y="2599231"/>
             <a:ext cx="4199666" cy="1288"/>
           </a:xfrm>
           <a:prstGeom prst="line">
@@ -3494,46 +3492,6 @@
           </a:fontRef>
         </p:style>
       </p:cxnSp>
-      <p:graphicFrame>
-        <p:nvGraphicFramePr>
-          <p:cNvPr id="46" name="Objet 45"/>
-          <p:cNvGraphicFramePr>
-            <a:graphicFrameLocks noChangeAspect="1"/>
-          </p:cNvGraphicFramePr>
-          <p:nvPr/>
-        </p:nvGraphicFramePr>
-        <p:xfrm>
-          <a:off x="5072066" y="4643446"/>
-          <a:ext cx="295276" cy="393701"/>
-        </p:xfrm>
-        <a:graphic>
-          <a:graphicData uri="http://schemas.openxmlformats.org/presentationml/2006/ole">
-            <p:oleObj spid="_x0000_s1026" name="Équation" r:id="rId3" imgW="152280" imgH="203040" progId="Equation.3">
-              <p:embed/>
-            </p:oleObj>
-          </a:graphicData>
-        </a:graphic>
-      </p:graphicFrame>
-      <p:graphicFrame>
-        <p:nvGraphicFramePr>
-          <p:cNvPr id="1027" name="Object 3"/>
-          <p:cNvGraphicFramePr>
-            <a:graphicFrameLocks noChangeAspect="1"/>
-          </p:cNvGraphicFramePr>
-          <p:nvPr/>
-        </p:nvGraphicFramePr>
-        <p:xfrm>
-          <a:off x="4714876" y="3571876"/>
-          <a:ext cx="271463" cy="428628"/>
-        </p:xfrm>
-        <a:graphic>
-          <a:graphicData uri="http://schemas.openxmlformats.org/presentationml/2006/ole">
-            <p:oleObj spid="_x0000_s1027" name="Équation" r:id="rId4" imgW="139680" imgH="203040" progId="Equation.3">
-              <p:embed/>
-            </p:oleObj>
-          </a:graphicData>
-        </a:graphic>
-      </p:graphicFrame>
       <p:cxnSp>
         <p:nvCxnSpPr>
           <p:cNvPr id="48" name="Connecteur droit 47"/>
@@ -3614,6 +3572,68 @@
               <a:latin typeface="Arial" pitchFamily="34" charset="0"/>
               <a:cs typeface="Arial" pitchFamily="34" charset="0"/>
             </a:endParaRPr>
+          </a:p>
+        </p:txBody>
+      </p:sp>
+      <p:sp>
+        <p:nvSpPr>
+          <p:cNvPr id="17" name="ZoneTexte 16"/>
+          <p:cNvSpPr txBox="1"/>
+          <p:nvPr/>
+        </p:nvSpPr>
+        <p:spPr>
+          <a:xfrm>
+            <a:off x="4586655" y="3539635"/>
+            <a:ext cx="571504" cy="461665"/>
+          </a:xfrm>
+          <a:prstGeom prst="rect">
+            <a:avLst/>
+          </a:prstGeom>
+          <a:noFill/>
+        </p:spPr>
+        <p:txBody>
+          <a:bodyPr wrap="square" rtlCol="0">
+            <a:spAutoFit/>
+          </a:bodyPr>
+          <a:lstStyle/>
+          <a:p>
+            <a:pPr algn="ctr"/>
+            <a:r>
+              <a:rPr lang="en-US" sz="2400" b="1" dirty="0" smtClean="0"/>
+              <a:t>T</a:t>
+            </a:r>
+            <a:endParaRPr lang="fr-FR" sz="2400" b="1" dirty="0"/>
+          </a:p>
+        </p:txBody>
+      </p:sp>
+      <p:sp>
+        <p:nvSpPr>
+          <p:cNvPr id="18" name="ZoneTexte 17"/>
+          <p:cNvSpPr txBox="1"/>
+          <p:nvPr/>
+        </p:nvSpPr>
+        <p:spPr>
+          <a:xfrm>
+            <a:off x="4964362" y="4500570"/>
+            <a:ext cx="571504" cy="461665"/>
+          </a:xfrm>
+          <a:prstGeom prst="rect">
+            <a:avLst/>
+          </a:prstGeom>
+          <a:noFill/>
+        </p:spPr>
+        <p:txBody>
+          <a:bodyPr wrap="square" rtlCol="0">
+            <a:spAutoFit/>
+          </a:bodyPr>
+          <a:lstStyle/>
+          <a:p>
+            <a:pPr algn="ctr"/>
+            <a:r>
+              <a:rPr lang="en-US" sz="2400" b="1" dirty="0" smtClean="0"/>
+              <a:t>P</a:t>
+            </a:r>
+            <a:endParaRPr lang="fr-FR" sz="2400" b="1" dirty="0"/>
           </a:p>
         </p:txBody>
       </p:sp>

</xml_diff>